<commit_message>
Add initial video code source file and slide on array limitations and that go arrays are not pointers
</commit_message>
<xml_diff>
--- a/slices/go_slices.pptx
+++ b/slices/go_slices.pptx
@@ -7,6 +7,8 @@
   <p:sldIdLst>
     <p:sldId id="256" r:id="rId2"/>
     <p:sldId id="257" r:id="rId3"/>
+    <p:sldId id="258" r:id="rId4"/>
+    <p:sldId id="259" r:id="rId5"/>
   </p:sldIdLst>
   <p:sldSz cx="12192000" cy="6858000"/>
   <p:notesSz cx="6858000" cy="9144000"/>
@@ -4370,15 +4372,7 @@
           <a:p>
             <a:r>
               <a:rPr lang="en-US" dirty="0"/>
-              <a:t>return the value at index 4 in our array, which </a:t>
-            </a:r>
-            <a:r>
-              <a:rPr lang="en-US"/>
-              <a:t>would give </a:t>
-            </a:r>
-            <a:r>
-              <a:rPr lang="en-US" dirty="0"/>
-              <a:t>us the integer 5 in our case.</a:t>
+              <a:t>return the value at index 4 in our array, which would give us the integer 5 in our case.</a:t>
             </a:r>
           </a:p>
         </p:txBody>
@@ -4387,6 +4381,195 @@
     <p:extLst>
       <p:ext uri="{BB962C8B-B14F-4D97-AF65-F5344CB8AC3E}">
         <p14:creationId xmlns:p14="http://schemas.microsoft.com/office/powerpoint/2010/main" val="174536890"/>
+      </p:ext>
+    </p:extLst>
+  </p:cSld>
+  <p:clrMapOvr>
+    <a:masterClrMapping/>
+  </p:clrMapOvr>
+</p:sld>
+</file>
+
+<file path=ppt/slides/slide3.xml><?xml version="1.0" encoding="utf-8"?>
+<p:sld xmlns:a="http://schemas.openxmlformats.org/drawingml/2006/main" xmlns:r="http://schemas.openxmlformats.org/officeDocument/2006/relationships" xmlns:p="http://schemas.openxmlformats.org/presentationml/2006/main">
+  <p:cSld>
+    <p:spTree>
+      <p:nvGrpSpPr>
+        <p:cNvPr id="1" name=""/>
+        <p:cNvGrpSpPr/>
+        <p:nvPr/>
+      </p:nvGrpSpPr>
+      <p:grpSpPr>
+        <a:xfrm>
+          <a:off x="0" y="0"/>
+          <a:ext cx="0" cy="0"/>
+          <a:chOff x="0" y="0"/>
+          <a:chExt cx="0" cy="0"/>
+        </a:xfrm>
+      </p:grpSpPr>
+      <p:sp>
+        <p:nvSpPr>
+          <p:cNvPr id="2" name="Title 1">
+            <a:extLst>
+              <a:ext uri="{FF2B5EF4-FFF2-40B4-BE49-F238E27FC236}">
+                <a16:creationId xmlns:a16="http://schemas.microsoft.com/office/drawing/2014/main" id="{86D78C29-A22D-4DDC-BC7C-1F363F05FAA8}"/>
+              </a:ext>
+            </a:extLst>
+          </p:cNvPr>
+          <p:cNvSpPr>
+            <a:spLocks noGrp="1"/>
+          </p:cNvSpPr>
+          <p:nvPr>
+            <p:ph type="title"/>
+          </p:nvPr>
+        </p:nvSpPr>
+        <p:spPr/>
+        <p:txBody>
+          <a:bodyPr/>
+          <a:lstStyle/>
+          <a:p>
+            <a:r>
+              <a:rPr lang="en-US" dirty="0"/>
+              <a:t>Side note on Go arrays</a:t>
+            </a:r>
+          </a:p>
+        </p:txBody>
+      </p:sp>
+      <p:sp>
+        <p:nvSpPr>
+          <p:cNvPr id="3" name="Content Placeholder 2">
+            <a:extLst>
+              <a:ext uri="{FF2B5EF4-FFF2-40B4-BE49-F238E27FC236}">
+                <a16:creationId xmlns:a16="http://schemas.microsoft.com/office/drawing/2014/main" id="{C4A93338-DA14-47D0-9489-B1D75579436A}"/>
+              </a:ext>
+            </a:extLst>
+          </p:cNvPr>
+          <p:cNvSpPr>
+            <a:spLocks noGrp="1"/>
+          </p:cNvSpPr>
+          <p:nvPr>
+            <p:ph idx="1"/>
+          </p:nvPr>
+        </p:nvSpPr>
+        <p:spPr/>
+        <p:txBody>
+          <a:bodyPr/>
+          <a:lstStyle/>
+          <a:p>
+            <a:r>
+              <a:rPr lang="en-US" dirty="0"/>
+              <a:t>Go arrays are values. Array variables represent the whole/entire array. IT IS NOT A POINTER TO THE FIRST ELEMENT IN THE ARRAY (C/C++). </a:t>
+            </a:r>
+          </a:p>
+          <a:p>
+            <a:r>
+              <a:rPr lang="en-US" dirty="0"/>
+              <a:t>Passing an array to a function or assigning it to another variable creates a copy of the array elements. </a:t>
+            </a:r>
+          </a:p>
+        </p:txBody>
+      </p:sp>
+    </p:spTree>
+    <p:extLst>
+      <p:ext uri="{BB962C8B-B14F-4D97-AF65-F5344CB8AC3E}">
+        <p14:creationId xmlns:p14="http://schemas.microsoft.com/office/powerpoint/2010/main" val="3764791189"/>
+      </p:ext>
+    </p:extLst>
+  </p:cSld>
+  <p:clrMapOvr>
+    <a:masterClrMapping/>
+  </p:clrMapOvr>
+</p:sld>
+</file>
+
+<file path=ppt/slides/slide4.xml><?xml version="1.0" encoding="utf-8"?>
+<p:sld xmlns:a="http://schemas.openxmlformats.org/drawingml/2006/main" xmlns:r="http://schemas.openxmlformats.org/officeDocument/2006/relationships" xmlns:p="http://schemas.openxmlformats.org/presentationml/2006/main">
+  <p:cSld>
+    <p:spTree>
+      <p:nvGrpSpPr>
+        <p:cNvPr id="1" name=""/>
+        <p:cNvGrpSpPr/>
+        <p:nvPr/>
+      </p:nvGrpSpPr>
+      <p:grpSpPr>
+        <a:xfrm>
+          <a:off x="0" y="0"/>
+          <a:ext cx="0" cy="0"/>
+          <a:chOff x="0" y="0"/>
+          <a:chExt cx="0" cy="0"/>
+        </a:xfrm>
+      </p:grpSpPr>
+      <p:sp>
+        <p:nvSpPr>
+          <p:cNvPr id="2" name="Title 1">
+            <a:extLst>
+              <a:ext uri="{FF2B5EF4-FFF2-40B4-BE49-F238E27FC236}">
+                <a16:creationId xmlns:a16="http://schemas.microsoft.com/office/drawing/2014/main" id="{BBF31837-C8AD-466F-87D7-9782D0198267}"/>
+              </a:ext>
+            </a:extLst>
+          </p:cNvPr>
+          <p:cNvSpPr>
+            <a:spLocks noGrp="1"/>
+          </p:cNvSpPr>
+          <p:nvPr>
+            <p:ph type="title"/>
+          </p:nvPr>
+        </p:nvSpPr>
+        <p:spPr/>
+        <p:txBody>
+          <a:bodyPr/>
+          <a:lstStyle/>
+          <a:p>
+            <a:r>
+              <a:rPr lang="en-US" dirty="0"/>
+              <a:t>Limitations on Arrays</a:t>
+            </a:r>
+          </a:p>
+        </p:txBody>
+      </p:sp>
+      <p:sp>
+        <p:nvSpPr>
+          <p:cNvPr id="3" name="Content Placeholder 2">
+            <a:extLst>
+              <a:ext uri="{FF2B5EF4-FFF2-40B4-BE49-F238E27FC236}">
+                <a16:creationId xmlns:a16="http://schemas.microsoft.com/office/drawing/2014/main" id="{2AB59998-3B8C-4CD8-8954-84A5D5216755}"/>
+              </a:ext>
+            </a:extLst>
+          </p:cNvPr>
+          <p:cNvSpPr>
+            <a:spLocks noGrp="1"/>
+          </p:cNvSpPr>
+          <p:nvPr>
+            <p:ph idx="1"/>
+          </p:nvPr>
+        </p:nvSpPr>
+        <p:spPr/>
+        <p:txBody>
+          <a:bodyPr/>
+          <a:lstStyle/>
+          <a:p>
+            <a:r>
+              <a:rPr lang="en-US" dirty="0"/>
+              <a:t>Arrays are the most primitive data structure and only have a set fixed length. </a:t>
+            </a:r>
+          </a:p>
+          <a:p>
+            <a:r>
+              <a:rPr lang="en-US" dirty="0"/>
+              <a:t>So this leads to a problem, what if we do not know how big of an array we want? We could just create an array that is very large, but that is a waste of computer memory if none of those allocated spots in the array are ever used. We could also create a very small array but what if now we need more size? Copy everything in the current array into another new larger array is costly in time. For example we have an array of 10,000 elements. Now we need to add one more element. We would need to create another array of larger size and copy all 10,000 </a:t>
+            </a:r>
+            <a:r>
+              <a:rPr lang="en-US"/>
+              <a:t>elements over.</a:t>
+            </a:r>
+            <a:endParaRPr lang="en-US" dirty="0"/>
+          </a:p>
+        </p:txBody>
+      </p:sp>
+    </p:spTree>
+    <p:extLst>
+      <p:ext uri="{BB962C8B-B14F-4D97-AF65-F5344CB8AC3E}">
+        <p14:creationId xmlns:p14="http://schemas.microsoft.com/office/powerpoint/2010/main" val="2345968253"/>
       </p:ext>
     </p:extLst>
   </p:cSld>

</xml_diff>

<commit_message>
Create slice syntax and functions slide
</commit_message>
<xml_diff>
--- a/slices/go_slices.pptx
+++ b/slices/go_slices.pptx
@@ -9,6 +9,8 @@
     <p:sldId id="257" r:id="rId3"/>
     <p:sldId id="258" r:id="rId4"/>
     <p:sldId id="259" r:id="rId5"/>
+    <p:sldId id="260" r:id="rId6"/>
+    <p:sldId id="261" r:id="rId7"/>
   </p:sldIdLst>
   <p:sldSz cx="12192000" cy="6858000"/>
   <p:notesSz cx="6858000" cy="9144000"/>
@@ -4556,13 +4558,14 @@
           <a:p>
             <a:r>
               <a:rPr lang="en-US" dirty="0"/>
-              <a:t>So this leads to a problem, what if we do not know how big of an array we want? We could just create an array that is very large, but that is a waste of computer memory if none of those allocated spots in the array are ever used. We could also create a very small array but what if now we need more size? Copy everything in the current array into another new larger array is costly in time. For example we have an array of 10,000 elements. Now we need to add one more element. We would need to create another array of larger size and copy all 10,000 </a:t>
-            </a:r>
-            <a:r>
-              <a:rPr lang="en-US"/>
-              <a:t>elements over.</a:t>
-            </a:r>
-            <a:endParaRPr lang="en-US" dirty="0"/>
+              <a:t>So this leads to a problem, what if we do not know how big of an array we want? We could just create an array that is very large, but that is a waste of computer memory if none of those allocated spots in the array are ever used. We could also create a very small array but what if now we need more size? Copy everything in the current array into another new larger array is costly in time. For example we have an array of 10,000 elements. Now we need to add one more element. We would need to create another array of larger size and copy all 10,000 elements over.</a:t>
+            </a:r>
+          </a:p>
+          <a:p>
+            <a:r>
+              <a:rPr lang="en-US" dirty="0"/>
+              <a:t>This is where slices come in.</a:t>
+            </a:r>
           </a:p>
         </p:txBody>
       </p:sp>
@@ -4570,6 +4573,182 @@
     <p:extLst>
       <p:ext uri="{BB962C8B-B14F-4D97-AF65-F5344CB8AC3E}">
         <p14:creationId xmlns:p14="http://schemas.microsoft.com/office/powerpoint/2010/main" val="2345968253"/>
+      </p:ext>
+    </p:extLst>
+  </p:cSld>
+  <p:clrMapOvr>
+    <a:masterClrMapping/>
+  </p:clrMapOvr>
+</p:sld>
+</file>
+
+<file path=ppt/slides/slide5.xml><?xml version="1.0" encoding="utf-8"?>
+<p:sld xmlns:a="http://schemas.openxmlformats.org/drawingml/2006/main" xmlns:r="http://schemas.openxmlformats.org/officeDocument/2006/relationships" xmlns:p="http://schemas.openxmlformats.org/presentationml/2006/main">
+  <p:cSld>
+    <p:spTree>
+      <p:nvGrpSpPr>
+        <p:cNvPr id="1" name=""/>
+        <p:cNvGrpSpPr/>
+        <p:nvPr/>
+      </p:nvGrpSpPr>
+      <p:grpSpPr>
+        <a:xfrm>
+          <a:off x="0" y="0"/>
+          <a:ext cx="0" cy="0"/>
+          <a:chOff x="0" y="0"/>
+          <a:chExt cx="0" cy="0"/>
+        </a:xfrm>
+      </p:grpSpPr>
+      <p:sp>
+        <p:nvSpPr>
+          <p:cNvPr id="2" name="Title 1">
+            <a:extLst>
+              <a:ext uri="{FF2B5EF4-FFF2-40B4-BE49-F238E27FC236}">
+                <a16:creationId xmlns:a16="http://schemas.microsoft.com/office/drawing/2014/main" id="{C0F825BA-8CD9-45E9-A50A-DA842794F523}"/>
+              </a:ext>
+            </a:extLst>
+          </p:cNvPr>
+          <p:cNvSpPr>
+            <a:spLocks noGrp="1"/>
+          </p:cNvSpPr>
+          <p:nvPr>
+            <p:ph type="title"/>
+          </p:nvPr>
+        </p:nvSpPr>
+        <p:spPr/>
+        <p:txBody>
+          <a:bodyPr/>
+          <a:lstStyle/>
+          <a:p>
+            <a:r>
+              <a:rPr lang="en-US" dirty="0"/>
+              <a:t>Slice internals</a:t>
+            </a:r>
+          </a:p>
+        </p:txBody>
+      </p:sp>
+      <p:sp>
+        <p:nvSpPr>
+          <p:cNvPr id="6" name="Content Placeholder 5">
+            <a:extLst>
+              <a:ext uri="{FF2B5EF4-FFF2-40B4-BE49-F238E27FC236}">
+                <a16:creationId xmlns:a16="http://schemas.microsoft.com/office/drawing/2014/main" id="{F58A4C04-8222-46E5-8BA1-E1B8BBA4202C}"/>
+              </a:ext>
+            </a:extLst>
+          </p:cNvPr>
+          <p:cNvSpPr>
+            <a:spLocks noGrp="1"/>
+          </p:cNvSpPr>
+          <p:nvPr>
+            <p:ph idx="1"/>
+          </p:nvPr>
+        </p:nvSpPr>
+        <p:spPr/>
+        <p:txBody>
+          <a:bodyPr/>
+          <a:lstStyle/>
+          <a:p>
+            <a:r>
+              <a:rPr lang="en-US" dirty="0">
+                <a:hlinkClick r:id="rId2"/>
+              </a:rPr>
+              <a:t>https://blog.golang.org/go-slices-usage-and-internals</a:t>
+            </a:r>
+            <a:endParaRPr lang="en-US" dirty="0"/>
+          </a:p>
+        </p:txBody>
+      </p:sp>
+    </p:spTree>
+    <p:extLst>
+      <p:ext uri="{BB962C8B-B14F-4D97-AF65-F5344CB8AC3E}">
+        <p14:creationId xmlns:p14="http://schemas.microsoft.com/office/powerpoint/2010/main" val="501482214"/>
+      </p:ext>
+    </p:extLst>
+  </p:cSld>
+  <p:clrMapOvr>
+    <a:masterClrMapping/>
+  </p:clrMapOvr>
+</p:sld>
+</file>
+
+<file path=ppt/slides/slide6.xml><?xml version="1.0" encoding="utf-8"?>
+<p:sld xmlns:a="http://schemas.openxmlformats.org/drawingml/2006/main" xmlns:r="http://schemas.openxmlformats.org/officeDocument/2006/relationships" xmlns:p="http://schemas.openxmlformats.org/presentationml/2006/main">
+  <p:cSld>
+    <p:spTree>
+      <p:nvGrpSpPr>
+        <p:cNvPr id="1" name=""/>
+        <p:cNvGrpSpPr/>
+        <p:nvPr/>
+      </p:nvGrpSpPr>
+      <p:grpSpPr>
+        <a:xfrm>
+          <a:off x="0" y="0"/>
+          <a:ext cx="0" cy="0"/>
+          <a:chOff x="0" y="0"/>
+          <a:chExt cx="0" cy="0"/>
+        </a:xfrm>
+      </p:grpSpPr>
+      <p:sp>
+        <p:nvSpPr>
+          <p:cNvPr id="2" name="Title 1">
+            <a:extLst>
+              <a:ext uri="{FF2B5EF4-FFF2-40B4-BE49-F238E27FC236}">
+                <a16:creationId xmlns:a16="http://schemas.microsoft.com/office/drawing/2014/main" id="{6F5EDB47-9E98-4F00-8B23-6B5C1BECC897}"/>
+              </a:ext>
+            </a:extLst>
+          </p:cNvPr>
+          <p:cNvSpPr>
+            <a:spLocks noGrp="1"/>
+          </p:cNvSpPr>
+          <p:nvPr>
+            <p:ph type="title"/>
+          </p:nvPr>
+        </p:nvSpPr>
+        <p:spPr/>
+        <p:txBody>
+          <a:bodyPr/>
+          <a:lstStyle/>
+          <a:p>
+            <a:r>
+              <a:rPr lang="en-US" dirty="0"/>
+              <a:t>Slice Syntax </a:t>
+            </a:r>
+            <a:r>
+              <a:rPr lang="en-US"/>
+              <a:t>&amp; Functions</a:t>
+            </a:r>
+          </a:p>
+        </p:txBody>
+      </p:sp>
+      <p:sp>
+        <p:nvSpPr>
+          <p:cNvPr id="3" name="Content Placeholder 2">
+            <a:extLst>
+              <a:ext uri="{FF2B5EF4-FFF2-40B4-BE49-F238E27FC236}">
+                <a16:creationId xmlns:a16="http://schemas.microsoft.com/office/drawing/2014/main" id="{84432D41-1F60-4D12-BACF-FFF52B506256}"/>
+              </a:ext>
+            </a:extLst>
+          </p:cNvPr>
+          <p:cNvSpPr>
+            <a:spLocks noGrp="1"/>
+          </p:cNvSpPr>
+          <p:nvPr>
+            <p:ph idx="1"/>
+          </p:nvPr>
+        </p:nvSpPr>
+        <p:spPr/>
+        <p:txBody>
+          <a:bodyPr/>
+          <a:lstStyle/>
+          <a:p>
+            <a:endParaRPr lang="en-US"/>
+          </a:p>
+        </p:txBody>
+      </p:sp>
+    </p:spTree>
+    <p:extLst>
+      <p:ext uri="{BB962C8B-B14F-4D97-AF65-F5344CB8AC3E}">
+        <p14:creationId xmlns:p14="http://schemas.microsoft.com/office/powerpoint/2010/main" val="1524706077"/>
       </p:ext>
     </p:extLst>
   </p:cSld>

</xml_diff>

<commit_message>
Add removing element from slice algorithm explanation
</commit_message>
<xml_diff>
--- a/slices/go_slices.pptx
+++ b/slices/go_slices.pptx
@@ -11,6 +11,7 @@
     <p:sldId id="259" r:id="rId5"/>
     <p:sldId id="260" r:id="rId6"/>
     <p:sldId id="261" r:id="rId7"/>
+    <p:sldId id="262" r:id="rId8"/>
   </p:sldIdLst>
   <p:sldSz cx="12192000" cy="6858000"/>
   <p:notesSz cx="6858000" cy="9144000"/>
@@ -4471,6 +4472,42 @@
           </a:p>
         </p:txBody>
       </p:sp>
+      <p:pic>
+        <p:nvPicPr>
+          <p:cNvPr id="4" name="Content Placeholder 4">
+            <a:extLst>
+              <a:ext uri="{FF2B5EF4-FFF2-40B4-BE49-F238E27FC236}">
+                <a16:creationId xmlns:a16="http://schemas.microsoft.com/office/drawing/2014/main" id="{09C74B49-09A0-48CC-8F73-D3047BDDA776}"/>
+              </a:ext>
+            </a:extLst>
+          </p:cNvPr>
+          <p:cNvPicPr>
+            <a:picLocks noChangeAspect="1"/>
+          </p:cNvPicPr>
+          <p:nvPr/>
+        </p:nvPicPr>
+        <p:blipFill>
+          <a:blip r:embed="rId2">
+            <a:extLst>
+              <a:ext uri="{28A0092B-C50C-407E-A947-70E740481C1C}">
+                <a14:useLocalDpi xmlns:a14="http://schemas.microsoft.com/office/drawing/2010/main" val="0"/>
+              </a:ext>
+            </a:extLst>
+          </a:blip>
+          <a:stretch>
+            <a:fillRect/>
+          </a:stretch>
+        </p:blipFill>
+        <p:spPr>
+          <a:xfrm>
+            <a:off x="1007532" y="3824685"/>
+            <a:ext cx="2286000" cy="2286000"/>
+          </a:xfrm>
+          <a:prstGeom prst="rect">
+            <a:avLst/>
+          </a:prstGeom>
+        </p:spPr>
+      </p:pic>
     </p:spTree>
     <p:extLst>
       <p:ext uri="{BB962C8B-B14F-4D97-AF65-F5344CB8AC3E}">
@@ -4569,6 +4606,42 @@
           </a:p>
         </p:txBody>
       </p:sp>
+      <p:pic>
+        <p:nvPicPr>
+          <p:cNvPr id="4" name="Content Placeholder 4">
+            <a:extLst>
+              <a:ext uri="{FF2B5EF4-FFF2-40B4-BE49-F238E27FC236}">
+                <a16:creationId xmlns:a16="http://schemas.microsoft.com/office/drawing/2014/main" id="{B00CF1E6-56A6-421F-B652-36E8C3497AEC}"/>
+              </a:ext>
+            </a:extLst>
+          </p:cNvPr>
+          <p:cNvPicPr>
+            <a:picLocks noChangeAspect="1"/>
+          </p:cNvPicPr>
+          <p:nvPr/>
+        </p:nvPicPr>
+        <p:blipFill>
+          <a:blip r:embed="rId2">
+            <a:extLst>
+              <a:ext uri="{28A0092B-C50C-407E-A947-70E740481C1C}">
+                <a14:useLocalDpi xmlns:a14="http://schemas.microsoft.com/office/drawing/2010/main" val="0"/>
+              </a:ext>
+            </a:extLst>
+          </a:blip>
+          <a:stretch>
+            <a:fillRect/>
+          </a:stretch>
+        </p:blipFill>
+        <p:spPr>
+          <a:xfrm>
+            <a:off x="1150777" y="3781142"/>
+            <a:ext cx="2286000" cy="2286000"/>
+          </a:xfrm>
+          <a:prstGeom prst="rect">
+            <a:avLst/>
+          </a:prstGeom>
+        </p:spPr>
+      </p:pic>
     </p:spTree>
     <p:extLst>
       <p:ext uri="{BB962C8B-B14F-4D97-AF65-F5344CB8AC3E}">
@@ -4658,6 +4731,42 @@
           </a:p>
         </p:txBody>
       </p:sp>
+      <p:pic>
+        <p:nvPicPr>
+          <p:cNvPr id="7" name="Content Placeholder 4">
+            <a:extLst>
+              <a:ext uri="{FF2B5EF4-FFF2-40B4-BE49-F238E27FC236}">
+                <a16:creationId xmlns:a16="http://schemas.microsoft.com/office/drawing/2014/main" id="{7B39C220-4F91-467C-B430-FA72455BC4A9}"/>
+              </a:ext>
+            </a:extLst>
+          </p:cNvPr>
+          <p:cNvPicPr>
+            <a:picLocks noChangeAspect="1"/>
+          </p:cNvPicPr>
+          <p:nvPr/>
+        </p:nvPicPr>
+        <p:blipFill>
+          <a:blip r:embed="rId3">
+            <a:extLst>
+              <a:ext uri="{28A0092B-C50C-407E-A947-70E740481C1C}">
+                <a14:useLocalDpi xmlns:a14="http://schemas.microsoft.com/office/drawing/2010/main" val="0"/>
+              </a:ext>
+            </a:extLst>
+          </a:blip>
+          <a:stretch>
+            <a:fillRect/>
+          </a:stretch>
+        </p:blipFill>
+        <p:spPr>
+          <a:xfrm>
+            <a:off x="1107234" y="3698748"/>
+            <a:ext cx="2286000" cy="2286000"/>
+          </a:xfrm>
+          <a:prstGeom prst="rect">
+            <a:avLst/>
+          </a:prstGeom>
+        </p:spPr>
+      </p:pic>
     </p:spTree>
     <p:extLst>
       <p:ext uri="{BB962C8B-B14F-4D97-AF65-F5344CB8AC3E}">
@@ -4711,11 +4820,7 @@
           <a:p>
             <a:r>
               <a:rPr lang="en-US" dirty="0"/>
-              <a:t>Slice Syntax </a:t>
-            </a:r>
-            <a:r>
-              <a:rPr lang="en-US"/>
-              <a:t>&amp; Functions</a:t>
+              <a:t>Slice Syntax &amp; Functions</a:t>
             </a:r>
           </a:p>
         </p:txBody>
@@ -4741,14 +4846,357 @@
           <a:bodyPr/>
           <a:lstStyle/>
           <a:p>
-            <a:endParaRPr lang="en-US"/>
-          </a:p>
-        </p:txBody>
-      </p:sp>
+            <a:r>
+              <a:rPr lang="en-US" dirty="0"/>
+              <a:t>Declare a slice variable (Two Ways)</a:t>
+            </a:r>
+          </a:p>
+          <a:p>
+            <a:pPr lvl="1"/>
+            <a:r>
+              <a:rPr lang="en-US" dirty="0" err="1"/>
+              <a:t>variableName</a:t>
+            </a:r>
+            <a:r>
+              <a:rPr lang="en-US" dirty="0"/>
+              <a:t> := make([]type, length, *capacity)</a:t>
+            </a:r>
+          </a:p>
+          <a:p>
+            <a:pPr lvl="1"/>
+            <a:r>
+              <a:rPr lang="en-US" dirty="0" err="1"/>
+              <a:t>variableName</a:t>
+            </a:r>
+            <a:r>
+              <a:rPr lang="en-US" dirty="0"/>
+              <a:t> := []type{initial elements}</a:t>
+            </a:r>
+          </a:p>
+          <a:p>
+            <a:r>
+              <a:rPr lang="en-US" dirty="0"/>
+              <a:t>Add new element to slice</a:t>
+            </a:r>
+          </a:p>
+          <a:p>
+            <a:pPr lvl="1"/>
+            <a:r>
+              <a:rPr lang="en-US" dirty="0"/>
+              <a:t>Use built in function append – </a:t>
+            </a:r>
+            <a:r>
+              <a:rPr lang="en-US" dirty="0" err="1"/>
+              <a:t>newSlice</a:t>
+            </a:r>
+            <a:r>
+              <a:rPr lang="en-US" dirty="0"/>
+              <a:t> = append(</a:t>
+            </a:r>
+            <a:r>
+              <a:rPr lang="en-US" dirty="0" err="1"/>
+              <a:t>oldSlice</a:t>
+            </a:r>
+            <a:r>
+              <a:rPr lang="en-US" dirty="0"/>
+              <a:t>, </a:t>
+            </a:r>
+            <a:r>
+              <a:rPr lang="en-US" dirty="0" err="1"/>
+              <a:t>newElement</a:t>
+            </a:r>
+            <a:r>
+              <a:rPr lang="en-US" dirty="0"/>
+              <a:t>). Remember append function always returns a new slice.</a:t>
+            </a:r>
+          </a:p>
+          <a:p>
+            <a:r>
+              <a:rPr lang="en-US" dirty="0"/>
+              <a:t>Get length of slice</a:t>
+            </a:r>
+          </a:p>
+          <a:p>
+            <a:pPr lvl="1"/>
+            <a:r>
+              <a:rPr lang="en-US" dirty="0"/>
+              <a:t>Use built in function </a:t>
+            </a:r>
+            <a:r>
+              <a:rPr lang="en-US" dirty="0" err="1"/>
+              <a:t>len</a:t>
+            </a:r>
+            <a:r>
+              <a:rPr lang="en-US" dirty="0"/>
+              <a:t> – </a:t>
+            </a:r>
+            <a:r>
+              <a:rPr lang="en-US" dirty="0" err="1"/>
+              <a:t>len</a:t>
+            </a:r>
+            <a:r>
+              <a:rPr lang="en-US" dirty="0"/>
+              <a:t>(</a:t>
+            </a:r>
+            <a:r>
+              <a:rPr lang="en-US" dirty="0" err="1"/>
+              <a:t>mySlice</a:t>
+            </a:r>
+            <a:r>
+              <a:rPr lang="en-US" dirty="0"/>
+              <a:t>).</a:t>
+            </a:r>
+          </a:p>
+          <a:p>
+            <a:r>
+              <a:rPr lang="en-US" dirty="0"/>
+              <a:t>Copy one slice variable to another slice variable</a:t>
+            </a:r>
+          </a:p>
+          <a:p>
+            <a:pPr lvl="1"/>
+            <a:r>
+              <a:rPr lang="en-US" dirty="0"/>
+              <a:t>To copy one slice to another use the build in function copy – copy(</a:t>
+            </a:r>
+            <a:r>
+              <a:rPr lang="en-US" dirty="0" err="1"/>
+              <a:t>dest</a:t>
+            </a:r>
+            <a:r>
+              <a:rPr lang="en-US" dirty="0"/>
+              <a:t> []type, </a:t>
+            </a:r>
+            <a:r>
+              <a:rPr lang="en-US" dirty="0" err="1"/>
+              <a:t>src</a:t>
+            </a:r>
+            <a:r>
+              <a:rPr lang="en-US" dirty="0"/>
+              <a:t> []type).</a:t>
+            </a:r>
+          </a:p>
+          <a:p>
+            <a:pPr lvl="1"/>
+            <a:endParaRPr lang="en-US" dirty="0"/>
+          </a:p>
+        </p:txBody>
+      </p:sp>
+      <p:pic>
+        <p:nvPicPr>
+          <p:cNvPr id="4" name="Content Placeholder 4">
+            <a:extLst>
+              <a:ext uri="{FF2B5EF4-FFF2-40B4-BE49-F238E27FC236}">
+                <a16:creationId xmlns:a16="http://schemas.microsoft.com/office/drawing/2014/main" id="{63F9A5E9-F882-4610-B519-C6C2A3C9E84B}"/>
+              </a:ext>
+            </a:extLst>
+          </p:cNvPr>
+          <p:cNvPicPr>
+            <a:picLocks noChangeAspect="1"/>
+          </p:cNvPicPr>
+          <p:nvPr/>
+        </p:nvPicPr>
+        <p:blipFill>
+          <a:blip r:embed="rId2">
+            <a:extLst>
+              <a:ext uri="{28A0092B-C50C-407E-A947-70E740481C1C}">
+                <a14:useLocalDpi xmlns:a14="http://schemas.microsoft.com/office/drawing/2010/main" val="0"/>
+              </a:ext>
+            </a:extLst>
+          </a:blip>
+          <a:stretch>
+            <a:fillRect/>
+          </a:stretch>
+        </p:blipFill>
+        <p:spPr>
+          <a:xfrm>
+            <a:off x="1119675" y="3793583"/>
+            <a:ext cx="2286000" cy="2286000"/>
+          </a:xfrm>
+          <a:prstGeom prst="rect">
+            <a:avLst/>
+          </a:prstGeom>
+        </p:spPr>
+      </p:pic>
     </p:spTree>
     <p:extLst>
       <p:ext uri="{BB962C8B-B14F-4D97-AF65-F5344CB8AC3E}">
         <p14:creationId xmlns:p14="http://schemas.microsoft.com/office/powerpoint/2010/main" val="1524706077"/>
+      </p:ext>
+    </p:extLst>
+  </p:cSld>
+  <p:clrMapOvr>
+    <a:masterClrMapping/>
+  </p:clrMapOvr>
+</p:sld>
+</file>
+
+<file path=ppt/slides/slide7.xml><?xml version="1.0" encoding="utf-8"?>
+<p:sld xmlns:a="http://schemas.openxmlformats.org/drawingml/2006/main" xmlns:r="http://schemas.openxmlformats.org/officeDocument/2006/relationships" xmlns:p="http://schemas.openxmlformats.org/presentationml/2006/main">
+  <p:cSld>
+    <p:spTree>
+      <p:nvGrpSpPr>
+        <p:cNvPr id="1" name=""/>
+        <p:cNvGrpSpPr/>
+        <p:nvPr/>
+      </p:nvGrpSpPr>
+      <p:grpSpPr>
+        <a:xfrm>
+          <a:off x="0" y="0"/>
+          <a:ext cx="0" cy="0"/>
+          <a:chOff x="0" y="0"/>
+          <a:chExt cx="0" cy="0"/>
+        </a:xfrm>
+      </p:grpSpPr>
+      <p:sp>
+        <p:nvSpPr>
+          <p:cNvPr id="2" name="Title 1">
+            <a:extLst>
+              <a:ext uri="{FF2B5EF4-FFF2-40B4-BE49-F238E27FC236}">
+                <a16:creationId xmlns:a16="http://schemas.microsoft.com/office/drawing/2014/main" id="{FEE7AB2D-204A-47E3-BB9E-13F2692A7580}"/>
+              </a:ext>
+            </a:extLst>
+          </p:cNvPr>
+          <p:cNvSpPr>
+            <a:spLocks noGrp="1"/>
+          </p:cNvSpPr>
+          <p:nvPr>
+            <p:ph type="title"/>
+          </p:nvPr>
+        </p:nvSpPr>
+        <p:spPr/>
+        <p:txBody>
+          <a:bodyPr/>
+          <a:lstStyle/>
+          <a:p>
+            <a:r>
+              <a:rPr lang="en-US" dirty="0"/>
+              <a:t>Slice Operator &amp; Removing Elements</a:t>
+            </a:r>
+          </a:p>
+        </p:txBody>
+      </p:sp>
+      <p:sp>
+        <p:nvSpPr>
+          <p:cNvPr id="3" name="Content Placeholder 2">
+            <a:extLst>
+              <a:ext uri="{FF2B5EF4-FFF2-40B4-BE49-F238E27FC236}">
+                <a16:creationId xmlns:a16="http://schemas.microsoft.com/office/drawing/2014/main" id="{8E835C17-A484-436F-B159-9ED4C9E3E2C7}"/>
+              </a:ext>
+            </a:extLst>
+          </p:cNvPr>
+          <p:cNvSpPr>
+            <a:spLocks noGrp="1"/>
+          </p:cNvSpPr>
+          <p:nvPr>
+            <p:ph idx="1"/>
+          </p:nvPr>
+        </p:nvSpPr>
+        <p:spPr/>
+        <p:txBody>
+          <a:bodyPr/>
+          <a:lstStyle/>
+          <a:p>
+            <a:r>
+              <a:rPr lang="en-US" dirty="0" err="1"/>
+              <a:t>variableName</a:t>
+            </a:r>
+            <a:r>
+              <a:rPr lang="en-US" dirty="0"/>
+              <a:t>[</a:t>
+            </a:r>
+            <a:r>
+              <a:rPr lang="en-US" dirty="0" err="1"/>
+              <a:t>fromLeft:toRight</a:t>
+            </a:r>
+            <a:r>
+              <a:rPr lang="en-US" dirty="0"/>
+              <a:t>]</a:t>
+            </a:r>
+          </a:p>
+          <a:p>
+            <a:r>
+              <a:rPr lang="en-US" dirty="0"/>
+              <a:t>For example we have the following slice [0, 1, 2, 3, 4, 5]</a:t>
+            </a:r>
+          </a:p>
+          <a:p>
+            <a:r>
+              <a:rPr lang="en-US" dirty="0"/>
+              <a:t>If we write the following slice[0:4], we get returned a new slice containing the elements from index 0 (inclusive) to index 4 (not inclusive). So in our example we get a slice containing [0, 1, 2, 3].</a:t>
+            </a:r>
+          </a:p>
+          <a:p>
+            <a:r>
+              <a:rPr lang="en-US" dirty="0"/>
+              <a:t>The following algorithm can be used to remove an element from a slice at a certain index.</a:t>
+            </a:r>
+          </a:p>
+          <a:p>
+            <a:r>
+              <a:rPr lang="en-US" dirty="0"/>
+              <a:t>Slice = append(Slice[:</a:t>
+            </a:r>
+            <a:r>
+              <a:rPr lang="en-US" dirty="0" err="1"/>
+              <a:t>indexOfElementToRemove</a:t>
+            </a:r>
+            <a:r>
+              <a:rPr lang="en-US" dirty="0"/>
+              <a:t>], Slice[</a:t>
+            </a:r>
+            <a:r>
+              <a:rPr lang="en-US" dirty="0" err="1"/>
+              <a:t>indexOfElementToRemove</a:t>
+            </a:r>
+            <a:r>
+              <a:rPr lang="en-US"/>
+              <a:t> + 1:]…)</a:t>
+            </a:r>
+            <a:endParaRPr lang="en-US" dirty="0"/>
+          </a:p>
+        </p:txBody>
+      </p:sp>
+      <p:pic>
+        <p:nvPicPr>
+          <p:cNvPr id="4" name="Content Placeholder 4">
+            <a:extLst>
+              <a:ext uri="{FF2B5EF4-FFF2-40B4-BE49-F238E27FC236}">
+                <a16:creationId xmlns:a16="http://schemas.microsoft.com/office/drawing/2014/main" id="{A5247242-9152-4100-AAD5-37C950467C51}"/>
+              </a:ext>
+            </a:extLst>
+          </p:cNvPr>
+          <p:cNvPicPr>
+            <a:picLocks noChangeAspect="1"/>
+          </p:cNvPicPr>
+          <p:nvPr/>
+        </p:nvPicPr>
+        <p:blipFill>
+          <a:blip r:embed="rId2">
+            <a:extLst>
+              <a:ext uri="{28A0092B-C50C-407E-A947-70E740481C1C}">
+                <a14:useLocalDpi xmlns:a14="http://schemas.microsoft.com/office/drawing/2010/main" val="0"/>
+              </a:ext>
+            </a:extLst>
+          </a:blip>
+          <a:stretch>
+            <a:fillRect/>
+          </a:stretch>
+        </p:blipFill>
+        <p:spPr>
+          <a:xfrm>
+            <a:off x="1200540" y="4135706"/>
+            <a:ext cx="2286000" cy="2286000"/>
+          </a:xfrm>
+          <a:prstGeom prst="rect">
+            <a:avLst/>
+          </a:prstGeom>
+        </p:spPr>
+      </p:pic>
+    </p:spTree>
+    <p:extLst>
+      <p:ext uri="{BB962C8B-B14F-4D97-AF65-F5344CB8AC3E}">
+        <p14:creationId xmlns:p14="http://schemas.microsoft.com/office/powerpoint/2010/main" val="1276387467"/>
       </p:ext>
     </p:extLst>
   </p:cSld>

</xml_diff>